<commit_message>
Update Careers in Business Intelligence.pptx
</commit_message>
<xml_diff>
--- a/SQLSat Baton Rouge BI 2020/Careers in Business Intelligence.pptx
+++ b/SQLSat Baton Rouge BI 2020/Careers in Business Intelligence.pptx
@@ -108,7 +108,33 @@
       </a:defRPr>
     </a:lvl9pPr>
   </p:defaultTextStyle>
+  <p:extLst>
+    <p:ext uri="{EFAFB233-063F-42B5-8137-9DF3F51BA10A}">
+      <p15:sldGuideLst xmlns:p15="http://schemas.microsoft.com/office/powerpoint/2012/main"/>
+    </p:ext>
+  </p:extLst>
 </p:presentation>
+</file>
+
+<file path=ppt/changesInfos/changesInfo1.xml><?xml version="1.0" encoding="utf-8"?>
+<pc:chgInfo xmlns:a="http://schemas.openxmlformats.org/drawingml/2006/main" xmlns:r="http://schemas.openxmlformats.org/officeDocument/2006/relationships" xmlns:ac="http://schemas.microsoft.com/office/drawing/2013/main/command" xmlns:pc="http://schemas.microsoft.com/office/powerpoint/2013/main/command">
+  <pc:docChgLst>
+    <pc:chgData name="william a" userId="c66c7249b60d4ab2" providerId="LiveId" clId="{04503E1E-BC36-4742-9174-2EF742E19055}"/>
+    <pc:docChg chg="modSld">
+      <pc:chgData name="william a" userId="c66c7249b60d4ab2" providerId="LiveId" clId="{04503E1E-BC36-4742-9174-2EF742E19055}" dt="2020-03-07T19:30:12.561" v="0" actId="20577"/>
+      <pc:docMkLst>
+        <pc:docMk/>
+      </pc:docMkLst>
+      <pc:sldChg chg="modNotesTx">
+        <pc:chgData name="william a" userId="c66c7249b60d4ab2" providerId="LiveId" clId="{04503E1E-BC36-4742-9174-2EF742E19055}" dt="2020-03-07T19:30:12.561" v="0" actId="20577"/>
+        <pc:sldMkLst>
+          <pc:docMk/>
+          <pc:sldMk cId="1690938764" sldId="321"/>
+        </pc:sldMkLst>
+      </pc:sldChg>
+    </pc:docChg>
+  </pc:docChgLst>
+</pc:chgInfo>
 </file>
 
 <file path=ppt/notesMasters/notesMaster1.xml><?xml version="1.0" encoding="utf-8"?>
@@ -193,7 +219,7 @@
           <a:p>
             <a:fld id="{3D955167-5C4B-4F2E-9A94-24A79FF8ED32}" type="datetimeFigureOut">
               <a:rPr lang="en-US" smtClean="0"/>
-              <a:t>3/2/2020</a:t>
+              <a:t>3/7/2020</a:t>
             </a:fld>
             <a:endParaRPr lang="en-US"/>
           </a:p>
@@ -504,119 +530,7 @@
           <a:bodyPr/>
           <a:lstStyle/>
           <a:p>
-            <a:r>
-              <a:rPr lang="en-CA" sz="1200" kern="1200">
-                <a:solidFill>
-                  <a:srgbClr val="FFFF00"/>
-                </a:solidFill>
-                <a:effectLst/>
-                <a:latin typeface="+mn-lt"/>
-                <a:ea typeface="+mn-ea"/>
-                <a:cs typeface="+mn-cs"/>
-              </a:rPr>
-              <a:t>C</a:t>
-            </a:r>
-          </a:p>
-          <a:p>
-            <a:endParaRPr lang="en-CA" sz="1200" kern="1200">
-              <a:solidFill>
-                <a:srgbClr val="FFFF00"/>
-              </a:solidFill>
-              <a:effectLst/>
-              <a:latin typeface="+mn-lt"/>
-              <a:ea typeface="+mn-ea"/>
-              <a:cs typeface="+mn-cs"/>
-            </a:endParaRPr>
-          </a:p>
-          <a:p>
-            <a:r>
-              <a:rPr lang="en-CA" sz="1200" kern="1200">
-                <a:solidFill>
-                  <a:srgbClr val="FFFF00"/>
-                </a:solidFill>
-                <a:effectLst/>
-                <a:latin typeface="+mn-lt"/>
-                <a:ea typeface="+mn-ea"/>
-                <a:cs typeface="+mn-cs"/>
-              </a:rPr>
-              <a:t>Hi, Welcome to Ethics in Modern Data. </a:t>
-            </a:r>
-            <a:br>
-              <a:rPr lang="en-CA" sz="1200" kern="1200">
-                <a:solidFill>
-                  <a:srgbClr val="FFFF00"/>
-                </a:solidFill>
-                <a:effectLst/>
-                <a:latin typeface="+mn-lt"/>
-                <a:ea typeface="+mn-ea"/>
-                <a:cs typeface="+mn-cs"/>
-              </a:rPr>
-            </a:br>
-            <a:br>
-              <a:rPr lang="en-CA" sz="1200" kern="1200">
-                <a:solidFill>
-                  <a:srgbClr val="FFFF00"/>
-                </a:solidFill>
-                <a:effectLst/>
-                <a:latin typeface="+mn-lt"/>
-                <a:ea typeface="+mn-ea"/>
-                <a:cs typeface="+mn-cs"/>
-              </a:rPr>
-            </a:br>
-            <a:r>
-              <a:rPr lang="en-CA" sz="1200" kern="1200">
-                <a:solidFill>
-                  <a:srgbClr val="FFFF00"/>
-                </a:solidFill>
-                <a:effectLst/>
-                <a:latin typeface="+mn-lt"/>
-                <a:ea typeface="+mn-ea"/>
-                <a:cs typeface="+mn-cs"/>
-              </a:rPr>
-              <a:t>My name is Christine Assaf</a:t>
-            </a:r>
-          </a:p>
-          <a:p>
-            <a:r>
-              <a:rPr lang="en-CA" sz="1200" i="1" kern="1200">
-                <a:solidFill>
-                  <a:srgbClr val="FFFF00"/>
-                </a:solidFill>
-                <a:effectLst/>
-                <a:latin typeface="+mn-lt"/>
-                <a:ea typeface="+mn-ea"/>
-                <a:cs typeface="+mn-cs"/>
-              </a:rPr>
-              <a:t>I’m William Assaf. </a:t>
-            </a:r>
-          </a:p>
-          <a:p>
-            <a:endParaRPr lang="en-CA" sz="1200" i="1" kern="1200">
-              <a:solidFill>
-                <a:srgbClr val="FFFF00"/>
-              </a:solidFill>
-              <a:effectLst/>
-              <a:latin typeface="+mn-lt"/>
-              <a:ea typeface="+mn-ea"/>
-              <a:cs typeface="+mn-cs"/>
-            </a:endParaRPr>
-          </a:p>
-          <a:p>
-            <a:r>
-              <a:rPr lang="en-CA" sz="1200" i="0" kern="1200">
-                <a:solidFill>
-                  <a:srgbClr val="FFFF00"/>
-                </a:solidFill>
-                <a:effectLst/>
-                <a:latin typeface="+mn-lt"/>
-                <a:ea typeface="+mn-ea"/>
-                <a:cs typeface="+mn-cs"/>
-              </a:rPr>
-              <a:t>Today we’re going to talk about Bias, transparency, and the impact of ethics in modern data. </a:t>
-            </a:r>
-          </a:p>
-          <a:p>
-            <a:endParaRPr lang="en-CA" sz="1200" kern="1200">
+            <a:endParaRPr lang="en-CA" sz="1200" kern="1200" dirty="0">
               <a:solidFill>
                 <a:srgbClr val="FFFF00"/>
               </a:solidFill>
@@ -811,7 +725,7 @@
           <a:p>
             <a:fld id="{778B3535-DE49-43F1-850F-75634A8958D2}" type="datetimeFigureOut">
               <a:rPr lang="en-US" smtClean="0"/>
-              <a:t>3/2/2020</a:t>
+              <a:t>3/7/2020</a:t>
             </a:fld>
             <a:endParaRPr lang="en-US"/>
           </a:p>
@@ -1009,7 +923,7 @@
           <a:p>
             <a:fld id="{778B3535-DE49-43F1-850F-75634A8958D2}" type="datetimeFigureOut">
               <a:rPr lang="en-US" smtClean="0"/>
-              <a:t>3/2/2020</a:t>
+              <a:t>3/7/2020</a:t>
             </a:fld>
             <a:endParaRPr lang="en-US"/>
           </a:p>
@@ -1217,7 +1131,7 @@
           <a:p>
             <a:fld id="{778B3535-DE49-43F1-850F-75634A8958D2}" type="datetimeFigureOut">
               <a:rPr lang="en-US" smtClean="0"/>
-              <a:t>3/2/2020</a:t>
+              <a:t>3/7/2020</a:t>
             </a:fld>
             <a:endParaRPr lang="en-US"/>
           </a:p>
@@ -1614,7 +1528,7 @@
           <a:p>
             <a:fld id="{778B3535-DE49-43F1-850F-75634A8958D2}" type="datetimeFigureOut">
               <a:rPr lang="en-US" smtClean="0"/>
-              <a:t>3/2/2020</a:t>
+              <a:t>3/7/2020</a:t>
             </a:fld>
             <a:endParaRPr lang="en-US"/>
           </a:p>
@@ -1889,7 +1803,7 @@
           <a:p>
             <a:fld id="{778B3535-DE49-43F1-850F-75634A8958D2}" type="datetimeFigureOut">
               <a:rPr lang="en-US" smtClean="0"/>
-              <a:t>3/2/2020</a:t>
+              <a:t>3/7/2020</a:t>
             </a:fld>
             <a:endParaRPr lang="en-US"/>
           </a:p>
@@ -2154,7 +2068,7 @@
           <a:p>
             <a:fld id="{778B3535-DE49-43F1-850F-75634A8958D2}" type="datetimeFigureOut">
               <a:rPr lang="en-US" smtClean="0"/>
-              <a:t>3/2/2020</a:t>
+              <a:t>3/7/2020</a:t>
             </a:fld>
             <a:endParaRPr lang="en-US"/>
           </a:p>
@@ -2566,7 +2480,7 @@
           <a:p>
             <a:fld id="{778B3535-DE49-43F1-850F-75634A8958D2}" type="datetimeFigureOut">
               <a:rPr lang="en-US" smtClean="0"/>
-              <a:t>3/2/2020</a:t>
+              <a:t>3/7/2020</a:t>
             </a:fld>
             <a:endParaRPr lang="en-US"/>
           </a:p>
@@ -2707,7 +2621,7 @@
           <a:p>
             <a:fld id="{778B3535-DE49-43F1-850F-75634A8958D2}" type="datetimeFigureOut">
               <a:rPr lang="en-US" smtClean="0"/>
-              <a:t>3/2/2020</a:t>
+              <a:t>3/7/2020</a:t>
             </a:fld>
             <a:endParaRPr lang="en-US"/>
           </a:p>
@@ -2820,7 +2734,7 @@
           <a:p>
             <a:fld id="{778B3535-DE49-43F1-850F-75634A8958D2}" type="datetimeFigureOut">
               <a:rPr lang="en-US" smtClean="0"/>
-              <a:t>3/2/2020</a:t>
+              <a:t>3/7/2020</a:t>
             </a:fld>
             <a:endParaRPr lang="en-US"/>
           </a:p>
@@ -3131,7 +3045,7 @@
           <a:p>
             <a:fld id="{778B3535-DE49-43F1-850F-75634A8958D2}" type="datetimeFigureOut">
               <a:rPr lang="en-US" smtClean="0"/>
-              <a:t>3/2/2020</a:t>
+              <a:t>3/7/2020</a:t>
             </a:fld>
             <a:endParaRPr lang="en-US"/>
           </a:p>
@@ -3419,7 +3333,7 @@
           <a:p>
             <a:fld id="{778B3535-DE49-43F1-850F-75634A8958D2}" type="datetimeFigureOut">
               <a:rPr lang="en-US" smtClean="0"/>
-              <a:t>3/2/2020</a:t>
+              <a:t>3/7/2020</a:t>
             </a:fld>
             <a:endParaRPr lang="en-US"/>
           </a:p>
@@ -3660,7 +3574,7 @@
           <a:p>
             <a:fld id="{778B3535-DE49-43F1-850F-75634A8958D2}" type="datetimeFigureOut">
               <a:rPr lang="en-US" smtClean="0"/>
-              <a:t>3/2/2020</a:t>
+              <a:t>3/7/2020</a:t>
             </a:fld>
             <a:endParaRPr lang="en-US"/>
           </a:p>

</xml_diff>